<commit_message>
Se agregaron nuevas capturas en la presentación
</commit_message>
<xml_diff>
--- a/presentacion/Demo Backend - CoderHouse.pptx
+++ b/presentacion/Demo Backend - CoderHouse.pptx
@@ -17,16 +17,18 @@
     <p:sldId id="262" r:id="rId12"/>
     <p:sldId id="263" r:id="rId13"/>
     <p:sldId id="264" r:id="rId14"/>
+    <p:sldId id="265" r:id="rId15"/>
+    <p:sldId id="266" r:id="rId16"/>
   </p:sldIdLst>
   <p:sldSz cy="5143500" cx="9144000"/>
   <p:notesSz cx="6858000" cy="9144000"/>
   <p:embeddedFontLst>
     <p:embeddedFont>
       <p:font typeface="Roboto"/>
-      <p:regular r:id="rId15"/>
-      <p:bold r:id="rId16"/>
-      <p:italic r:id="rId17"/>
-      <p:boldItalic r:id="rId18"/>
+      <p:regular r:id="rId17"/>
+      <p:bold r:id="rId18"/>
+      <p:italic r:id="rId19"/>
+      <p:boldItalic r:id="rId20"/>
     </p:embeddedFont>
   </p:embeddedFontLst>
   <p:defaultTextStyle>
@@ -802,6 +804,204 @@
 </p:notes>
 </file>
 
+<file path=ppt/notesSlides/notesSlide10.xml><?xml version="1.0" encoding="utf-8"?>
+<p:notes xmlns:a="http://schemas.openxmlformats.org/drawingml/2006/main" xmlns:r="http://schemas.openxmlformats.org/officeDocument/2006/relationships" xmlns:mc="http://schemas.openxmlformats.org/markup-compatibility/2006" xmlns:mv="urn:schemas-microsoft-com:mac:vml" xmlns:p="http://schemas.openxmlformats.org/presentationml/2006/main" xmlns:c="http://schemas.openxmlformats.org/drawingml/2006/chart" xmlns:dgm="http://schemas.openxmlformats.org/drawingml/2006/diagram" xmlns:o="urn:schemas-microsoft-com:office:office" xmlns:v="urn:schemas-microsoft-com:vml" xmlns:pvml="urn:schemas-microsoft-com:office:powerpoint" xmlns:com="http://schemas.openxmlformats.org/drawingml/2006/compatibility" xmlns:p14="http://schemas.microsoft.com/office/powerpoint/2010/main" xmlns:p15="http://schemas.microsoft.com/office/powerpoint/2012/main" xmlns:ahyp="http://schemas.microsoft.com/office/drawing/2018/hyperlinkcolor" showMasterPhAnim="0" showMasterSp="0">
+  <p:cSld>
+    <p:spTree>
+      <p:nvGrpSpPr>
+        <p:cNvPr id="135" name="Shape 135"/>
+        <p:cNvGrpSpPr/>
+        <p:nvPr/>
+      </p:nvGrpSpPr>
+      <p:grpSpPr>
+        <a:xfrm>
+          <a:off x="0" y="0"/>
+          <a:ext cx="0" cy="0"/>
+          <a:chOff x="0" y="0"/>
+          <a:chExt cx="0" cy="0"/>
+        </a:xfrm>
+      </p:grpSpPr>
+      <p:sp>
+        <p:nvSpPr>
+          <p:cNvPr id="136" name="Google Shape;136;gd0dee6203d_0_108:notes"/>
+          <p:cNvSpPr/>
+          <p:nvPr>
+            <p:ph idx="2" type="sldImg"/>
+          </p:nvPr>
+        </p:nvSpPr>
+        <p:spPr>
+          <a:xfrm>
+            <a:off x="381300" y="685800"/>
+            <a:ext cx="6096000" cy="3429000"/>
+          </a:xfrm>
+          <a:custGeom>
+            <a:rect b="b" l="l" r="r" t="t"/>
+            <a:pathLst>
+              <a:path extrusionOk="0" h="120000" w="120000">
+                <a:moveTo>
+                  <a:pt x="0" y="0"/>
+                </a:moveTo>
+                <a:lnTo>
+                  <a:pt x="120000" y="0"/>
+                </a:lnTo>
+                <a:lnTo>
+                  <a:pt x="120000" y="120000"/>
+                </a:lnTo>
+                <a:lnTo>
+                  <a:pt x="0" y="120000"/>
+                </a:lnTo>
+                <a:close/>
+              </a:path>
+            </a:pathLst>
+          </a:custGeom>
+        </p:spPr>
+      </p:sp>
+      <p:sp>
+        <p:nvSpPr>
+          <p:cNvPr id="137" name="Google Shape;137;gd0dee6203d_0_108:notes"/>
+          <p:cNvSpPr txBox="1"/>
+          <p:nvPr>
+            <p:ph idx="1" type="body"/>
+          </p:nvPr>
+        </p:nvSpPr>
+        <p:spPr>
+          <a:xfrm>
+            <a:off x="685800" y="4343400"/>
+            <a:ext cx="5486400" cy="4114800"/>
+          </a:xfrm>
+          <a:prstGeom prst="rect">
+            <a:avLst/>
+          </a:prstGeom>
+        </p:spPr>
+        <p:txBody>
+          <a:bodyPr anchorCtr="0" anchor="t" bIns="91425" lIns="91425" spcFirstLastPara="1" rIns="91425" wrap="square" tIns="91425">
+            <a:noAutofit/>
+          </a:bodyPr>
+          <a:lstStyle/>
+          <a:p>
+            <a:pPr indent="0" lvl="0" marL="0" rtl="0" algn="l">
+              <a:spcBef>
+                <a:spcPts val="0"/>
+              </a:spcBef>
+              <a:spcAft>
+                <a:spcPts val="0"/>
+              </a:spcAft>
+              <a:buNone/>
+            </a:pPr>
+            <a:r>
+              <a:t/>
+            </a:r>
+            <a:endParaRPr/>
+          </a:p>
+        </p:txBody>
+      </p:sp>
+    </p:spTree>
+  </p:cSld>
+  <p:clrMapOvr>
+    <a:masterClrMapping/>
+  </p:clrMapOvr>
+</p:notes>
+</file>
+
+<file path=ppt/notesSlides/notesSlide11.xml><?xml version="1.0" encoding="utf-8"?>
+<p:notes xmlns:a="http://schemas.openxmlformats.org/drawingml/2006/main" xmlns:r="http://schemas.openxmlformats.org/officeDocument/2006/relationships" xmlns:mc="http://schemas.openxmlformats.org/markup-compatibility/2006" xmlns:mv="urn:schemas-microsoft-com:mac:vml" xmlns:p="http://schemas.openxmlformats.org/presentationml/2006/main" xmlns:c="http://schemas.openxmlformats.org/drawingml/2006/chart" xmlns:dgm="http://schemas.openxmlformats.org/drawingml/2006/diagram" xmlns:o="urn:schemas-microsoft-com:office:office" xmlns:v="urn:schemas-microsoft-com:vml" xmlns:pvml="urn:schemas-microsoft-com:office:powerpoint" xmlns:com="http://schemas.openxmlformats.org/drawingml/2006/compatibility" xmlns:p14="http://schemas.microsoft.com/office/powerpoint/2010/main" xmlns:p15="http://schemas.microsoft.com/office/powerpoint/2012/main" xmlns:ahyp="http://schemas.microsoft.com/office/drawing/2018/hyperlinkcolor" showMasterPhAnim="0" showMasterSp="0">
+  <p:cSld>
+    <p:spTree>
+      <p:nvGrpSpPr>
+        <p:cNvPr id="141" name="Shape 141"/>
+        <p:cNvGrpSpPr/>
+        <p:nvPr/>
+      </p:nvGrpSpPr>
+      <p:grpSpPr>
+        <a:xfrm>
+          <a:off x="0" y="0"/>
+          <a:ext cx="0" cy="0"/>
+          <a:chOff x="0" y="0"/>
+          <a:chExt cx="0" cy="0"/>
+        </a:xfrm>
+      </p:grpSpPr>
+      <p:sp>
+        <p:nvSpPr>
+          <p:cNvPr id="142" name="Google Shape;142;gd0dee6203d_0_114:notes"/>
+          <p:cNvSpPr/>
+          <p:nvPr>
+            <p:ph idx="2" type="sldImg"/>
+          </p:nvPr>
+        </p:nvSpPr>
+        <p:spPr>
+          <a:xfrm>
+            <a:off x="381300" y="685800"/>
+            <a:ext cx="6096000" cy="3429000"/>
+          </a:xfrm>
+          <a:custGeom>
+            <a:rect b="b" l="l" r="r" t="t"/>
+            <a:pathLst>
+              <a:path extrusionOk="0" h="120000" w="120000">
+                <a:moveTo>
+                  <a:pt x="0" y="0"/>
+                </a:moveTo>
+                <a:lnTo>
+                  <a:pt x="120000" y="0"/>
+                </a:lnTo>
+                <a:lnTo>
+                  <a:pt x="120000" y="120000"/>
+                </a:lnTo>
+                <a:lnTo>
+                  <a:pt x="0" y="120000"/>
+                </a:lnTo>
+                <a:close/>
+              </a:path>
+            </a:pathLst>
+          </a:custGeom>
+        </p:spPr>
+      </p:sp>
+      <p:sp>
+        <p:nvSpPr>
+          <p:cNvPr id="143" name="Google Shape;143;gd0dee6203d_0_114:notes"/>
+          <p:cNvSpPr txBox="1"/>
+          <p:nvPr>
+            <p:ph idx="1" type="body"/>
+          </p:nvPr>
+        </p:nvSpPr>
+        <p:spPr>
+          <a:xfrm>
+            <a:off x="685800" y="4343400"/>
+            <a:ext cx="5486400" cy="4114800"/>
+          </a:xfrm>
+          <a:prstGeom prst="rect">
+            <a:avLst/>
+          </a:prstGeom>
+        </p:spPr>
+        <p:txBody>
+          <a:bodyPr anchorCtr="0" anchor="t" bIns="91425" lIns="91425" spcFirstLastPara="1" rIns="91425" wrap="square" tIns="91425">
+            <a:noAutofit/>
+          </a:bodyPr>
+          <a:lstStyle/>
+          <a:p>
+            <a:pPr indent="0" lvl="0" marL="0" rtl="0" algn="l">
+              <a:spcBef>
+                <a:spcPts val="0"/>
+              </a:spcBef>
+              <a:spcAft>
+                <a:spcPts val="0"/>
+              </a:spcAft>
+              <a:buNone/>
+            </a:pPr>
+            <a:r>
+              <a:t/>
+            </a:r>
+            <a:endParaRPr/>
+          </a:p>
+        </p:txBody>
+      </p:sp>
+    </p:spTree>
+  </p:cSld>
+  <p:clrMapOvr>
+    <a:masterClrMapping/>
+  </p:clrMapOvr>
+</p:notes>
+</file>
+
 <file path=ppt/notesSlides/notesSlide2.xml><?xml version="1.0" encoding="utf-8"?>
 <p:notes xmlns:a="http://schemas.openxmlformats.org/drawingml/2006/main" xmlns:r="http://schemas.openxmlformats.org/officeDocument/2006/relationships" xmlns:mc="http://schemas.openxmlformats.org/markup-compatibility/2006" xmlns:mv="urn:schemas-microsoft-com:mac:vml" xmlns:p="http://schemas.openxmlformats.org/presentationml/2006/main" xmlns:c="http://schemas.openxmlformats.org/drawingml/2006/chart" xmlns:dgm="http://schemas.openxmlformats.org/drawingml/2006/diagram" xmlns:o="urn:schemas-microsoft-com:office:office" xmlns:v="urn:schemas-microsoft-com:vml" xmlns:pvml="urn:schemas-microsoft-com:office:powerpoint" xmlns:com="http://schemas.openxmlformats.org/drawingml/2006/compatibility" xmlns:p14="http://schemas.microsoft.com/office/powerpoint/2010/main" xmlns:p15="http://schemas.microsoft.com/office/powerpoint/2012/main" xmlns:ahyp="http://schemas.microsoft.com/office/drawing/2018/hyperlinkcolor" showMasterPhAnim="0" showMasterSp="0">
   <p:cSld>
@@ -1019,7 +1219,7 @@
       </p:grpSpPr>
       <p:sp>
         <p:nvSpPr>
-          <p:cNvPr id="100" name="Google Shape;100;gd0dee6203d_0_88:notes"/>
+          <p:cNvPr id="100" name="Google Shape;100;gd0dee6203d_0_119:notes"/>
           <p:cNvSpPr/>
           <p:nvPr>
             <p:ph idx="2" type="sldImg"/>
@@ -1054,7 +1254,7 @@
       </p:sp>
       <p:sp>
         <p:nvSpPr>
-          <p:cNvPr id="101" name="Google Shape;101;gd0dee6203d_0_88:notes"/>
+          <p:cNvPr id="101" name="Google Shape;101;gd0dee6203d_0_119:notes"/>
           <p:cNvSpPr txBox="1"/>
           <p:nvPr>
             <p:ph idx="1" type="body"/>
@@ -1118,7 +1318,7 @@
       </p:grpSpPr>
       <p:sp>
         <p:nvSpPr>
-          <p:cNvPr id="106" name="Google Shape;106;gd0dee6203d_0_93:notes"/>
+          <p:cNvPr id="106" name="Google Shape;106;gd0dee6203d_0_88:notes"/>
           <p:cNvSpPr/>
           <p:nvPr>
             <p:ph idx="2" type="sldImg"/>
@@ -1153,7 +1353,7 @@
       </p:sp>
       <p:sp>
         <p:nvSpPr>
-          <p:cNvPr id="107" name="Google Shape;107;gd0dee6203d_0_93:notes"/>
+          <p:cNvPr id="107" name="Google Shape;107;gd0dee6203d_0_88:notes"/>
           <p:cNvSpPr txBox="1"/>
           <p:nvPr>
             <p:ph idx="1" type="body"/>
@@ -1217,7 +1417,7 @@
       </p:grpSpPr>
       <p:sp>
         <p:nvSpPr>
-          <p:cNvPr id="112" name="Google Shape;112;gd0dee6203d_0_98:notes"/>
+          <p:cNvPr id="112" name="Google Shape;112;gd0dee6203d_0_93:notes"/>
           <p:cNvSpPr/>
           <p:nvPr>
             <p:ph idx="2" type="sldImg"/>
@@ -1252,7 +1452,7 @@
       </p:sp>
       <p:sp>
         <p:nvSpPr>
-          <p:cNvPr id="113" name="Google Shape;113;gd0dee6203d_0_98:notes"/>
+          <p:cNvPr id="113" name="Google Shape;113;gd0dee6203d_0_93:notes"/>
           <p:cNvSpPr txBox="1"/>
           <p:nvPr>
             <p:ph idx="1" type="body"/>
@@ -1316,7 +1516,7 @@
       </p:grpSpPr>
       <p:sp>
         <p:nvSpPr>
-          <p:cNvPr id="118" name="Google Shape;118;gd0dee6203d_0_103:notes"/>
+          <p:cNvPr id="118" name="Google Shape;118;gd0dee6203d_0_98:notes"/>
           <p:cNvSpPr/>
           <p:nvPr>
             <p:ph idx="2" type="sldImg"/>
@@ -1351,7 +1551,7 @@
       </p:sp>
       <p:sp>
         <p:nvSpPr>
-          <p:cNvPr id="119" name="Google Shape;119;gd0dee6203d_0_103:notes"/>
+          <p:cNvPr id="119" name="Google Shape;119;gd0dee6203d_0_98:notes"/>
           <p:cNvSpPr txBox="1"/>
           <p:nvPr>
             <p:ph idx="1" type="body"/>
@@ -1415,7 +1615,7 @@
       </p:grpSpPr>
       <p:sp>
         <p:nvSpPr>
-          <p:cNvPr id="124" name="Google Shape;124;gd0dee6203d_0_108:notes"/>
+          <p:cNvPr id="124" name="Google Shape;124;gd0dee6203d_0_103:notes"/>
           <p:cNvSpPr/>
           <p:nvPr>
             <p:ph idx="2" type="sldImg"/>
@@ -1450,7 +1650,7 @@
       </p:sp>
       <p:sp>
         <p:nvSpPr>
-          <p:cNvPr id="125" name="Google Shape;125;gd0dee6203d_0_108:notes"/>
+          <p:cNvPr id="125" name="Google Shape;125;gd0dee6203d_0_103:notes"/>
           <p:cNvSpPr txBox="1"/>
           <p:nvPr>
             <p:ph idx="1" type="body"/>
@@ -1514,7 +1714,7 @@
       </p:grpSpPr>
       <p:sp>
         <p:nvSpPr>
-          <p:cNvPr id="130" name="Google Shape;130;gd0dee6203d_0_114:notes"/>
+          <p:cNvPr id="130" name="Google Shape;130;gd0dee6203d_0_125:notes"/>
           <p:cNvSpPr/>
           <p:nvPr>
             <p:ph idx="2" type="sldImg"/>
@@ -1549,7 +1749,7 @@
       </p:sp>
       <p:sp>
         <p:nvSpPr>
-          <p:cNvPr id="131" name="Google Shape;131;gd0dee6203d_0_114:notes"/>
+          <p:cNvPr id="131" name="Google Shape;131;gd0dee6203d_0_125:notes"/>
           <p:cNvSpPr txBox="1"/>
           <p:nvPr>
             <p:ph idx="1" type="body"/>
@@ -8311,6 +8511,164 @@
 </p:sld>
 </file>
 
+<file path=ppt/slides/slide10.xml><?xml version="1.0" encoding="utf-8"?>
+<p:sld xmlns:a="http://schemas.openxmlformats.org/drawingml/2006/main" xmlns:r="http://schemas.openxmlformats.org/officeDocument/2006/relationships" xmlns:mc="http://schemas.openxmlformats.org/markup-compatibility/2006" xmlns:mv="urn:schemas-microsoft-com:mac:vml" xmlns:p="http://schemas.openxmlformats.org/presentationml/2006/main" xmlns:c="http://schemas.openxmlformats.org/drawingml/2006/chart" xmlns:dgm="http://schemas.openxmlformats.org/drawingml/2006/diagram" xmlns:o="urn:schemas-microsoft-com:office:office" xmlns:v="urn:schemas-microsoft-com:vml" xmlns:pvml="urn:schemas-microsoft-com:office:powerpoint" xmlns:com="http://schemas.openxmlformats.org/drawingml/2006/compatibility" xmlns:p14="http://schemas.microsoft.com/office/powerpoint/2010/main" xmlns:p15="http://schemas.microsoft.com/office/powerpoint/2012/main" xmlns:ahyp="http://schemas.microsoft.com/office/drawing/2018/hyperlinkcolor">
+  <p:cSld>
+    <p:spTree>
+      <p:nvGrpSpPr>
+        <p:cNvPr id="138" name="Shape 138"/>
+        <p:cNvGrpSpPr/>
+        <p:nvPr/>
+      </p:nvGrpSpPr>
+      <p:grpSpPr>
+        <a:xfrm>
+          <a:off x="0" y="0"/>
+          <a:ext cx="0" cy="0"/>
+          <a:chOff x="0" y="0"/>
+          <a:chExt cx="0" cy="0"/>
+        </a:xfrm>
+      </p:grpSpPr>
+      <p:sp>
+        <p:nvSpPr>
+          <p:cNvPr id="139" name="Google Shape;139;p22"/>
+          <p:cNvSpPr txBox="1"/>
+          <p:nvPr>
+            <p:ph type="title"/>
+          </p:nvPr>
+        </p:nvSpPr>
+        <p:spPr>
+          <a:xfrm>
+            <a:off x="311700" y="410000"/>
+            <a:ext cx="8520600" cy="607800"/>
+          </a:xfrm>
+          <a:prstGeom prst="rect">
+            <a:avLst/>
+          </a:prstGeom>
+        </p:spPr>
+        <p:txBody>
+          <a:bodyPr anchorCtr="0" anchor="t" bIns="91425" lIns="91425" spcFirstLastPara="1" rIns="91425" wrap="square" tIns="91425">
+            <a:normAutofit fontScale="90000"/>
+          </a:bodyPr>
+          <a:lstStyle/>
+          <a:p>
+            <a:pPr indent="0" lvl="0" marL="0" rtl="0" algn="l">
+              <a:spcBef>
+                <a:spcPts val="0"/>
+              </a:spcBef>
+              <a:spcAft>
+                <a:spcPts val="0"/>
+              </a:spcAft>
+              <a:buNone/>
+            </a:pPr>
+            <a:r>
+              <a:rPr lang="es-419"/>
+              <a:t>¿Preguntas?</a:t>
+            </a:r>
+            <a:endParaRPr/>
+          </a:p>
+        </p:txBody>
+      </p:sp>
+      <p:pic>
+        <p:nvPicPr>
+          <p:cNvPr id="140" name="Google Shape;140;p22"/>
+          <p:cNvPicPr preferRelativeResize="0"/>
+          <p:nvPr/>
+        </p:nvPicPr>
+        <p:blipFill>
+          <a:blip r:embed="rId3">
+            <a:alphaModFix/>
+          </a:blip>
+          <a:stretch>
+            <a:fillRect/>
+          </a:stretch>
+        </p:blipFill>
+        <p:spPr>
+          <a:xfrm>
+            <a:off x="2781300" y="1327750"/>
+            <a:ext cx="3581400" cy="3143250"/>
+          </a:xfrm>
+          <a:prstGeom prst="rect">
+            <a:avLst/>
+          </a:prstGeom>
+          <a:noFill/>
+          <a:ln>
+            <a:noFill/>
+          </a:ln>
+        </p:spPr>
+      </p:pic>
+    </p:spTree>
+  </p:cSld>
+  <p:clrMapOvr>
+    <a:masterClrMapping/>
+  </p:clrMapOvr>
+</p:sld>
+</file>
+
+<file path=ppt/slides/slide11.xml><?xml version="1.0" encoding="utf-8"?>
+<p:sld xmlns:a="http://schemas.openxmlformats.org/drawingml/2006/main" xmlns:r="http://schemas.openxmlformats.org/officeDocument/2006/relationships" xmlns:mc="http://schemas.openxmlformats.org/markup-compatibility/2006" xmlns:mv="urn:schemas-microsoft-com:mac:vml" xmlns:p="http://schemas.openxmlformats.org/presentationml/2006/main" xmlns:c="http://schemas.openxmlformats.org/drawingml/2006/chart" xmlns:dgm="http://schemas.openxmlformats.org/drawingml/2006/diagram" xmlns:o="urn:schemas-microsoft-com:office:office" xmlns:v="urn:schemas-microsoft-com:vml" xmlns:pvml="urn:schemas-microsoft-com:office:powerpoint" xmlns:com="http://schemas.openxmlformats.org/drawingml/2006/compatibility" xmlns:p14="http://schemas.microsoft.com/office/powerpoint/2010/main" xmlns:p15="http://schemas.microsoft.com/office/powerpoint/2012/main" xmlns:ahyp="http://schemas.microsoft.com/office/drawing/2018/hyperlinkcolor">
+  <p:cSld>
+    <p:spTree>
+      <p:nvGrpSpPr>
+        <p:cNvPr id="144" name="Shape 144"/>
+        <p:cNvGrpSpPr/>
+        <p:nvPr/>
+      </p:nvGrpSpPr>
+      <p:grpSpPr>
+        <a:xfrm>
+          <a:off x="0" y="0"/>
+          <a:ext cx="0" cy="0"/>
+          <a:chOff x="0" y="0"/>
+          <a:chExt cx="0" cy="0"/>
+        </a:xfrm>
+      </p:grpSpPr>
+      <p:sp>
+        <p:nvSpPr>
+          <p:cNvPr id="145" name="Google Shape;145;p23"/>
+          <p:cNvSpPr txBox="1"/>
+          <p:nvPr>
+            <p:ph type="title"/>
+          </p:nvPr>
+        </p:nvSpPr>
+        <p:spPr>
+          <a:xfrm>
+            <a:off x="598100" y="2152347"/>
+            <a:ext cx="8222100" cy="838800"/>
+          </a:xfrm>
+          <a:prstGeom prst="rect">
+            <a:avLst/>
+          </a:prstGeom>
+        </p:spPr>
+        <p:txBody>
+          <a:bodyPr anchorCtr="0" anchor="ctr" bIns="91425" lIns="91425" spcFirstLastPara="1" rIns="91425" wrap="square" tIns="91425">
+            <a:normAutofit/>
+          </a:bodyPr>
+          <a:lstStyle/>
+          <a:p>
+            <a:pPr indent="0" lvl="0" marL="0" rtl="0" algn="l">
+              <a:spcBef>
+                <a:spcPts val="0"/>
+              </a:spcBef>
+              <a:spcAft>
+                <a:spcPts val="0"/>
+              </a:spcAft>
+              <a:buNone/>
+            </a:pPr>
+            <a:r>
+              <a:rPr lang="es-419"/>
+              <a:t>Gracias por su atencion!</a:t>
+            </a:r>
+            <a:endParaRPr/>
+          </a:p>
+        </p:txBody>
+      </p:sp>
+    </p:spTree>
+  </p:cSld>
+  <p:clrMapOvr>
+    <a:masterClrMapping/>
+  </p:clrMapOvr>
+</p:sld>
+</file>
+
 <file path=ppt/slides/slide2.xml><?xml version="1.0" encoding="utf-8"?>
 <p:sld xmlns:a="http://schemas.openxmlformats.org/drawingml/2006/main" xmlns:r="http://schemas.openxmlformats.org/officeDocument/2006/relationships" xmlns:mc="http://schemas.openxmlformats.org/markup-compatibility/2006" xmlns:mv="urn:schemas-microsoft-com:mac:vml" xmlns:p="http://schemas.openxmlformats.org/presentationml/2006/main" xmlns:c="http://schemas.openxmlformats.org/drawingml/2006/chart" xmlns:dgm="http://schemas.openxmlformats.org/drawingml/2006/diagram" xmlns:o="urn:schemas-microsoft-com:office:office" xmlns:v="urn:schemas-microsoft-com:vml" xmlns:pvml="urn:schemas-microsoft-com:office:powerpoint" xmlns:com="http://schemas.openxmlformats.org/drawingml/2006/compatibility" xmlns:p14="http://schemas.microsoft.com/office/powerpoint/2010/main" xmlns:p15="http://schemas.microsoft.com/office/powerpoint/2012/main" xmlns:ahyp="http://schemas.microsoft.com/office/drawing/2018/hyperlinkcolor">
   <p:cSld>
@@ -8682,6 +9040,99 @@
             </a:pPr>
             <a:r>
               <a:rPr lang="es-419"/>
+              <a:t>¿Como funciona NodeJS?</a:t>
+            </a:r>
+            <a:endParaRPr/>
+          </a:p>
+        </p:txBody>
+      </p:sp>
+      <p:pic>
+        <p:nvPicPr>
+          <p:cNvPr id="104" name="Google Shape;104;p16"/>
+          <p:cNvPicPr preferRelativeResize="0"/>
+          <p:nvPr/>
+        </p:nvPicPr>
+        <p:blipFill>
+          <a:blip r:embed="rId3">
+            <a:alphaModFix/>
+          </a:blip>
+          <a:stretch>
+            <a:fillRect/>
+          </a:stretch>
+        </p:blipFill>
+        <p:spPr>
+          <a:xfrm>
+            <a:off x="1373775" y="1017801"/>
+            <a:ext cx="6396449" cy="3599250"/>
+          </a:xfrm>
+          <a:prstGeom prst="rect">
+            <a:avLst/>
+          </a:prstGeom>
+          <a:noFill/>
+          <a:ln>
+            <a:noFill/>
+          </a:ln>
+        </p:spPr>
+      </p:pic>
+    </p:spTree>
+  </p:cSld>
+  <p:clrMapOvr>
+    <a:masterClrMapping/>
+  </p:clrMapOvr>
+</p:sld>
+</file>
+
+<file path=ppt/slides/slide5.xml><?xml version="1.0" encoding="utf-8"?>
+<p:sld xmlns:a="http://schemas.openxmlformats.org/drawingml/2006/main" xmlns:r="http://schemas.openxmlformats.org/officeDocument/2006/relationships" xmlns:mc="http://schemas.openxmlformats.org/markup-compatibility/2006" xmlns:mv="urn:schemas-microsoft-com:mac:vml" xmlns:p="http://schemas.openxmlformats.org/presentationml/2006/main" xmlns:c="http://schemas.openxmlformats.org/drawingml/2006/chart" xmlns:dgm="http://schemas.openxmlformats.org/drawingml/2006/diagram" xmlns:o="urn:schemas-microsoft-com:office:office" xmlns:v="urn:schemas-microsoft-com:vml" xmlns:pvml="urn:schemas-microsoft-com:office:powerpoint" xmlns:com="http://schemas.openxmlformats.org/drawingml/2006/compatibility" xmlns:p14="http://schemas.microsoft.com/office/powerpoint/2010/main" xmlns:p15="http://schemas.microsoft.com/office/powerpoint/2012/main" xmlns:ahyp="http://schemas.microsoft.com/office/drawing/2018/hyperlinkcolor">
+  <p:cSld>
+    <p:spTree>
+      <p:nvGrpSpPr>
+        <p:cNvPr id="108" name="Shape 108"/>
+        <p:cNvGrpSpPr/>
+        <p:nvPr/>
+      </p:nvGrpSpPr>
+      <p:grpSpPr>
+        <a:xfrm>
+          <a:off x="0" y="0"/>
+          <a:ext cx="0" cy="0"/>
+          <a:chOff x="0" y="0"/>
+          <a:chExt cx="0" cy="0"/>
+        </a:xfrm>
+      </p:grpSpPr>
+      <p:sp>
+        <p:nvSpPr>
+          <p:cNvPr id="109" name="Google Shape;109;p17"/>
+          <p:cNvSpPr txBox="1"/>
+          <p:nvPr>
+            <p:ph type="title"/>
+          </p:nvPr>
+        </p:nvSpPr>
+        <p:spPr>
+          <a:xfrm>
+            <a:off x="311700" y="410000"/>
+            <a:ext cx="8520600" cy="607800"/>
+          </a:xfrm>
+          <a:prstGeom prst="rect">
+            <a:avLst/>
+          </a:prstGeom>
+        </p:spPr>
+        <p:txBody>
+          <a:bodyPr anchorCtr="0" anchor="t" bIns="91425" lIns="91425" spcFirstLastPara="1" rIns="91425" wrap="square" tIns="91425">
+            <a:normAutofit fontScale="90000"/>
+          </a:bodyPr>
+          <a:lstStyle/>
+          <a:p>
+            <a:pPr indent="0" lvl="0" marL="0" rtl="0" algn="l">
+              <a:spcBef>
+                <a:spcPts val="0"/>
+              </a:spcBef>
+              <a:spcAft>
+                <a:spcPts val="0"/>
+              </a:spcAft>
+              <a:buNone/>
+            </a:pPr>
+            <a:r>
+              <a:rPr lang="es-419"/>
               <a:t>Programación sincrona</a:t>
             </a:r>
             <a:endParaRPr/>
@@ -8690,7 +9141,7 @@
       </p:sp>
       <p:sp>
         <p:nvSpPr>
-          <p:cNvPr id="104" name="Google Shape;104;p16"/>
+          <p:cNvPr id="110" name="Google Shape;110;p17"/>
           <p:cNvSpPr txBox="1"/>
           <p:nvPr>
             <p:ph idx="1" type="body"/>
@@ -8826,250 +9277,6 @@
             <a:r>
               <a:rPr lang="es-419"/>
               <a:t>Veamos un ejemplo!</a:t>
-            </a:r>
-            <a:endParaRPr/>
-          </a:p>
-        </p:txBody>
-      </p:sp>
-    </p:spTree>
-  </p:cSld>
-  <p:clrMapOvr>
-    <a:masterClrMapping/>
-  </p:clrMapOvr>
-</p:sld>
-</file>
-
-<file path=ppt/slides/slide5.xml><?xml version="1.0" encoding="utf-8"?>
-<p:sld xmlns:a="http://schemas.openxmlformats.org/drawingml/2006/main" xmlns:r="http://schemas.openxmlformats.org/officeDocument/2006/relationships" xmlns:mc="http://schemas.openxmlformats.org/markup-compatibility/2006" xmlns:mv="urn:schemas-microsoft-com:mac:vml" xmlns:p="http://schemas.openxmlformats.org/presentationml/2006/main" xmlns:c="http://schemas.openxmlformats.org/drawingml/2006/chart" xmlns:dgm="http://schemas.openxmlformats.org/drawingml/2006/diagram" xmlns:o="urn:schemas-microsoft-com:office:office" xmlns:v="urn:schemas-microsoft-com:vml" xmlns:pvml="urn:schemas-microsoft-com:office:powerpoint" xmlns:com="http://schemas.openxmlformats.org/drawingml/2006/compatibility" xmlns:p14="http://schemas.microsoft.com/office/powerpoint/2010/main" xmlns:p15="http://schemas.microsoft.com/office/powerpoint/2012/main" xmlns:ahyp="http://schemas.microsoft.com/office/drawing/2018/hyperlinkcolor">
-  <p:cSld>
-    <p:spTree>
-      <p:nvGrpSpPr>
-        <p:cNvPr id="108" name="Shape 108"/>
-        <p:cNvGrpSpPr/>
-        <p:nvPr/>
-      </p:nvGrpSpPr>
-      <p:grpSpPr>
-        <a:xfrm>
-          <a:off x="0" y="0"/>
-          <a:ext cx="0" cy="0"/>
-          <a:chOff x="0" y="0"/>
-          <a:chExt cx="0" cy="0"/>
-        </a:xfrm>
-      </p:grpSpPr>
-      <p:sp>
-        <p:nvSpPr>
-          <p:cNvPr id="109" name="Google Shape;109;p17"/>
-          <p:cNvSpPr txBox="1"/>
-          <p:nvPr>
-            <p:ph type="title"/>
-          </p:nvPr>
-        </p:nvSpPr>
-        <p:spPr>
-          <a:xfrm>
-            <a:off x="311700" y="410000"/>
-            <a:ext cx="8520600" cy="607800"/>
-          </a:xfrm>
-          <a:prstGeom prst="rect">
-            <a:avLst/>
-          </a:prstGeom>
-        </p:spPr>
-        <p:txBody>
-          <a:bodyPr anchorCtr="0" anchor="t" bIns="91425" lIns="91425" spcFirstLastPara="1" rIns="91425" wrap="square" tIns="91425">
-            <a:normAutofit fontScale="90000"/>
-          </a:bodyPr>
-          <a:lstStyle/>
-          <a:p>
-            <a:pPr indent="0" lvl="0" marL="0" rtl="0" algn="l">
-              <a:spcBef>
-                <a:spcPts val="0"/>
-              </a:spcBef>
-              <a:spcAft>
-                <a:spcPts val="0"/>
-              </a:spcAft>
-              <a:buNone/>
-            </a:pPr>
-            <a:r>
-              <a:rPr lang="es-419"/>
-              <a:t>Programación </a:t>
-            </a:r>
-            <a:r>
-              <a:rPr lang="es-419"/>
-              <a:t>asíncrona - callbacks</a:t>
-            </a:r>
-            <a:endParaRPr/>
-          </a:p>
-        </p:txBody>
-      </p:sp>
-      <p:sp>
-        <p:nvSpPr>
-          <p:cNvPr id="110" name="Google Shape;110;p17"/>
-          <p:cNvSpPr txBox="1"/>
-          <p:nvPr>
-            <p:ph idx="1" type="body"/>
-          </p:nvPr>
-        </p:nvSpPr>
-        <p:spPr>
-          <a:xfrm>
-            <a:off x="311700" y="1229875"/>
-            <a:ext cx="8520600" cy="3339000"/>
-          </a:xfrm>
-          <a:prstGeom prst="rect">
-            <a:avLst/>
-          </a:prstGeom>
-        </p:spPr>
-        <p:txBody>
-          <a:bodyPr anchorCtr="0" anchor="t" bIns="91425" lIns="91425" spcFirstLastPara="1" rIns="91425" wrap="square" tIns="91425">
-            <a:normAutofit/>
-          </a:bodyPr>
-          <a:lstStyle/>
-          <a:p>
-            <a:pPr indent="0" lvl="0" marL="0" rtl="0" algn="l">
-              <a:spcBef>
-                <a:spcPts val="0"/>
-              </a:spcBef>
-              <a:spcAft>
-                <a:spcPts val="0"/>
-              </a:spcAft>
-              <a:buNone/>
-            </a:pPr>
-            <a:r>
-              <a:rPr lang="es-419"/>
-              <a:t>En la </a:t>
-            </a:r>
-            <a:r>
-              <a:rPr lang="es-419"/>
-              <a:t>programación</a:t>
-            </a:r>
-            <a:r>
-              <a:rPr lang="es-419"/>
-              <a:t> </a:t>
-            </a:r>
-            <a:r>
-              <a:rPr lang="es-419"/>
-              <a:t>asíncrona</a:t>
-            </a:r>
-            <a:r>
-              <a:rPr lang="es-419"/>
-              <a:t>, las instrucciones se ejecutan a destiempo.</a:t>
-            </a:r>
-            <a:endParaRPr/>
-          </a:p>
-          <a:p>
-            <a:pPr indent="0" lvl="0" marL="0" rtl="0" algn="l">
-              <a:spcBef>
-                <a:spcPts val="1200"/>
-              </a:spcBef>
-              <a:spcAft>
-                <a:spcPts val="0"/>
-              </a:spcAft>
-              <a:buNone/>
-            </a:pPr>
-            <a:r>
-              <a:rPr lang="es-419"/>
-              <a:t>Esto permite ejecutar </a:t>
-            </a:r>
-            <a:r>
-              <a:rPr lang="es-419"/>
-              <a:t>múltiples</a:t>
-            </a:r>
-            <a:r>
-              <a:rPr lang="es-419"/>
-              <a:t> procesos al mismo tiempo dando la </a:t>
-            </a:r>
-            <a:r>
-              <a:rPr lang="es-419"/>
-              <a:t>sensación</a:t>
-            </a:r>
-            <a:r>
-              <a:rPr lang="es-419"/>
-              <a:t> de ser </a:t>
-            </a:r>
-            <a:r>
-              <a:rPr lang="es-419"/>
-              <a:t>más</a:t>
-            </a:r>
-            <a:r>
-              <a:rPr lang="es-419"/>
-              <a:t> </a:t>
-            </a:r>
-            <a:r>
-              <a:rPr lang="es-419"/>
-              <a:t>rápido</a:t>
-            </a:r>
-            <a:r>
-              <a:rPr lang="es-419"/>
-              <a:t>.</a:t>
-            </a:r>
-            <a:endParaRPr/>
-          </a:p>
-          <a:p>
-            <a:pPr indent="0" lvl="0" marL="0" rtl="0" algn="l">
-              <a:spcBef>
-                <a:spcPts val="1200"/>
-              </a:spcBef>
-              <a:spcAft>
-                <a:spcPts val="0"/>
-              </a:spcAft>
-              <a:buNone/>
-            </a:pPr>
-            <a:r>
-              <a:rPr lang="es-419"/>
-              <a:t>Una desventaja es el consumo de recursos, puede ser costoso!</a:t>
-            </a:r>
-            <a:endParaRPr/>
-          </a:p>
-          <a:p>
-            <a:pPr indent="0" lvl="0" marL="0" rtl="0" algn="l">
-              <a:spcBef>
-                <a:spcPts val="1200"/>
-              </a:spcBef>
-              <a:spcAft>
-                <a:spcPts val="0"/>
-              </a:spcAft>
-              <a:buNone/>
-            </a:pPr>
-            <a:r>
-              <a:rPr lang="es-419"/>
-              <a:t>Puede resultar </a:t>
-            </a:r>
-            <a:r>
-              <a:rPr lang="es-419"/>
-              <a:t>difícil</a:t>
-            </a:r>
-            <a:r>
-              <a:rPr lang="es-419"/>
-              <a:t> al principio, pero con practica se logra comprender.</a:t>
-            </a:r>
-            <a:endParaRPr/>
-          </a:p>
-          <a:p>
-            <a:pPr indent="0" lvl="0" marL="0" rtl="0" algn="l">
-              <a:spcBef>
-                <a:spcPts val="1200"/>
-              </a:spcBef>
-              <a:spcAft>
-                <a:spcPts val="0"/>
-              </a:spcAft>
-              <a:buNone/>
-            </a:pPr>
-            <a:r>
-              <a:t/>
-            </a:r>
-            <a:endParaRPr/>
-          </a:p>
-          <a:p>
-            <a:pPr indent="0" lvl="0" marL="0" rtl="0" algn="l">
-              <a:spcBef>
-                <a:spcPts val="1200"/>
-              </a:spcBef>
-              <a:spcAft>
-                <a:spcPts val="1200"/>
-              </a:spcAft>
-              <a:buNone/>
-            </a:pPr>
-            <a:r>
-              <a:rPr lang="es-419"/>
-              <a:t>Veamos otro ejemplo!</a:t>
             </a:r>
             <a:endParaRPr/>
           </a:p>
@@ -9138,11 +9345,7 @@
             </a:r>
             <a:r>
               <a:rPr lang="es-419"/>
-              <a:t>asíncrona</a:t>
-            </a:r>
-            <a:r>
-              <a:rPr lang="es-419"/>
-              <a:t> - promesas</a:t>
+              <a:t>asíncrona - callbacks</a:t>
             </a:r>
             <a:endParaRPr/>
           </a:p>
@@ -9182,19 +9385,11 @@
             </a:pPr>
             <a:r>
               <a:rPr lang="es-419"/>
-              <a:t>Anteriormente vimos </a:t>
+              <a:t>En la </a:t>
             </a:r>
             <a:r>
               <a:rPr lang="es-419"/>
-              <a:t>cómo</a:t>
-            </a:r>
-            <a:r>
-              <a:rPr lang="es-419"/>
-              <a:t> ejecutar un </a:t>
-            </a:r>
-            <a:r>
-              <a:rPr lang="es-419"/>
-              <a:t>código</a:t>
+              <a:t>programación</a:t>
             </a:r>
             <a:r>
               <a:rPr lang="es-419"/>
@@ -9202,11 +9397,11 @@
             </a:r>
             <a:r>
               <a:rPr lang="es-419"/>
-              <a:t>asíncrono</a:t>
+              <a:t>asíncrona</a:t>
             </a:r>
             <a:r>
               <a:rPr lang="es-419"/>
-              <a:t> usando callbacks.</a:t>
+              <a:t>, las instrucciones se ejecutan a destiempo.</a:t>
             </a:r>
             <a:endParaRPr/>
           </a:p>
@@ -9222,7 +9417,39 @@
             </a:pPr>
             <a:r>
               <a:rPr lang="es-419"/>
-              <a:t>Veamos ahora otra forma de utilizar la asincronicidad, las denominadas “promesas”</a:t>
+              <a:t>Esto permite ejecutar </a:t>
+            </a:r>
+            <a:r>
+              <a:rPr lang="es-419"/>
+              <a:t>múltiples</a:t>
+            </a:r>
+            <a:r>
+              <a:rPr lang="es-419"/>
+              <a:t> procesos al mismo tiempo dando la </a:t>
+            </a:r>
+            <a:r>
+              <a:rPr lang="es-419"/>
+              <a:t>sensación</a:t>
+            </a:r>
+            <a:r>
+              <a:rPr lang="es-419"/>
+              <a:t> de ser </a:t>
+            </a:r>
+            <a:r>
+              <a:rPr lang="es-419"/>
+              <a:t>más</a:t>
+            </a:r>
+            <a:r>
+              <a:rPr lang="es-419"/>
+              <a:t> </a:t>
+            </a:r>
+            <a:r>
+              <a:rPr lang="es-419"/>
+              <a:t>rápido</a:t>
+            </a:r>
+            <a:r>
+              <a:rPr lang="es-419"/>
+              <a:t>.</a:t>
             </a:r>
             <a:endParaRPr/>
           </a:p>
@@ -9238,7 +9465,31 @@
             </a:pPr>
             <a:r>
               <a:rPr lang="es-419"/>
-              <a:t>Las promesas son otra forma de manejar la asincronicidad utilizando un objeto que determina si la promesa falla o ejecuta correctamente.</a:t>
+              <a:t>Una desventaja es el consumo de recursos, puede ser costoso!</a:t>
+            </a:r>
+            <a:endParaRPr/>
+          </a:p>
+          <a:p>
+            <a:pPr indent="0" lvl="0" marL="0" rtl="0" algn="l">
+              <a:spcBef>
+                <a:spcPts val="1200"/>
+              </a:spcBef>
+              <a:spcAft>
+                <a:spcPts val="0"/>
+              </a:spcAft>
+              <a:buNone/>
+            </a:pPr>
+            <a:r>
+              <a:rPr lang="es-419"/>
+              <a:t>Puede resultar </a:t>
+            </a:r>
+            <a:r>
+              <a:rPr lang="es-419"/>
+              <a:t>difícil</a:t>
+            </a:r>
+            <a:r>
+              <a:rPr lang="es-419"/>
+              <a:t> al principio, pero con practica se logra comprender.</a:t>
             </a:r>
             <a:endParaRPr/>
           </a:p>
@@ -9269,15 +9520,7 @@
             </a:pPr>
             <a:r>
               <a:rPr lang="es-419"/>
-              <a:t>Vamos al </a:t>
-            </a:r>
-            <a:r>
-              <a:rPr lang="es-419"/>
-              <a:t>código</a:t>
-            </a:r>
-            <a:r>
-              <a:rPr lang="es-419"/>
-              <a:t>!</a:t>
+              <a:t>Veamos otro ejemplo!</a:t>
             </a:r>
             <a:endParaRPr/>
           </a:p>
@@ -9342,7 +9585,15 @@
             </a:pPr>
             <a:r>
               <a:rPr lang="es-419"/>
-              <a:t>Actividad</a:t>
+              <a:t>Programación </a:t>
+            </a:r>
+            <a:r>
+              <a:rPr lang="es-419"/>
+              <a:t>asíncrona</a:t>
+            </a:r>
+            <a:r>
+              <a:rPr lang="es-419"/>
+              <a:t> - promesas</a:t>
             </a:r>
             <a:endParaRPr/>
           </a:p>
@@ -9382,31 +9633,31 @@
             </a:pPr>
             <a:r>
               <a:rPr lang="es-419"/>
-              <a:t>Escribir una </a:t>
+              <a:t>Anteriormente vimos </a:t>
             </a:r>
             <a:r>
               <a:rPr lang="es-419"/>
-              <a:t>función</a:t>
+              <a:t>cómo</a:t>
             </a:r>
             <a:r>
               <a:rPr lang="es-419"/>
-              <a:t> que reciba dos </a:t>
+              <a:t> ejecutar un </a:t>
             </a:r>
             <a:r>
               <a:rPr lang="es-419"/>
-              <a:t>números</a:t>
+              <a:t>código</a:t>
             </a:r>
             <a:r>
               <a:rPr lang="es-419"/>
-              <a:t> y devuelva en el callback el mayor entre dos </a:t>
+              <a:t> </a:t>
             </a:r>
             <a:r>
               <a:rPr lang="es-419"/>
-              <a:t>números</a:t>
+              <a:t>asíncrono</a:t>
             </a:r>
             <a:r>
               <a:rPr lang="es-419"/>
-              <a:t>.</a:t>
+              <a:t> usando callbacks.</a:t>
             </a:r>
             <a:endParaRPr/>
           </a:p>
@@ -9422,13 +9673,9 @@
             </a:pPr>
             <a:r>
               <a:rPr lang="es-419"/>
-              <a:t>Recordar: </a:t>
+              <a:t>Veamos ahora otra forma de utilizar la asincronicidad, las denominadas “promesas”</a:t>
             </a:r>
-            <a:r>
-              <a:rPr b="1" lang="es-419"/>
-              <a:t>function mayor(a, b, callback) { }</a:t>
-            </a:r>
-            <a:endParaRPr b="1"/>
+            <a:endParaRPr/>
           </a:p>
           <a:p>
             <a:pPr indent="0" lvl="0" marL="0" rtl="0" algn="l">
@@ -9436,14 +9683,54 @@
                 <a:spcPts val="1200"/>
               </a:spcBef>
               <a:spcAft>
+                <a:spcPts val="0"/>
+              </a:spcAft>
+              <a:buNone/>
+            </a:pPr>
+            <a:r>
+              <a:rPr lang="es-419"/>
+              <a:t>Las promesas son otra forma de manejar la asincronicidad utilizando un objeto que determina si la promesa falla o ejecuta correctamente.</a:t>
+            </a:r>
+            <a:endParaRPr/>
+          </a:p>
+          <a:p>
+            <a:pPr indent="0" lvl="0" marL="0" rtl="0" algn="l">
+              <a:spcBef>
                 <a:spcPts val="1200"/>
+              </a:spcBef>
+              <a:spcAft>
+                <a:spcPts val="0"/>
               </a:spcAft>
               <a:buNone/>
             </a:pPr>
             <a:r>
               <a:t/>
             </a:r>
-            <a:endParaRPr b="1"/>
+            <a:endParaRPr/>
+          </a:p>
+          <a:p>
+            <a:pPr indent="0" lvl="0" marL="0" rtl="0" algn="l">
+              <a:spcBef>
+                <a:spcPts val="1200"/>
+              </a:spcBef>
+              <a:spcAft>
+                <a:spcPts val="1200"/>
+              </a:spcAft>
+              <a:buNone/>
+            </a:pPr>
+            <a:r>
+              <a:rPr lang="es-419"/>
+              <a:t>Vamos al </a:t>
+            </a:r>
+            <a:r>
+              <a:rPr lang="es-419"/>
+              <a:t>código</a:t>
+            </a:r>
+            <a:r>
+              <a:rPr lang="es-419"/>
+              <a:t>!</a:t>
+            </a:r>
+            <a:endParaRPr/>
           </a:p>
         </p:txBody>
       </p:sp>
@@ -9506,40 +9793,111 @@
             </a:pPr>
             <a:r>
               <a:rPr lang="es-419"/>
-              <a:t>¿Preguntas?</a:t>
+              <a:t>Actividad</a:t>
             </a:r>
             <a:endParaRPr/>
           </a:p>
         </p:txBody>
       </p:sp>
-      <p:pic>
-        <p:nvPicPr>
+      <p:sp>
+        <p:nvSpPr>
           <p:cNvPr id="128" name="Google Shape;128;p20"/>
-          <p:cNvPicPr preferRelativeResize="0"/>
-          <p:nvPr/>
-        </p:nvPicPr>
-        <p:blipFill>
-          <a:blip r:embed="rId3">
-            <a:alphaModFix/>
-          </a:blip>
-          <a:stretch>
-            <a:fillRect/>
-          </a:stretch>
-        </p:blipFill>
+          <p:cNvSpPr txBox="1"/>
+          <p:nvPr>
+            <p:ph idx="1" type="body"/>
+          </p:nvPr>
+        </p:nvSpPr>
         <p:spPr>
           <a:xfrm>
-            <a:off x="2781300" y="1327750"/>
-            <a:ext cx="3581400" cy="3143250"/>
+            <a:off x="311700" y="1229875"/>
+            <a:ext cx="8520600" cy="3339000"/>
           </a:xfrm>
           <a:prstGeom prst="rect">
             <a:avLst/>
           </a:prstGeom>
-          <a:noFill/>
-          <a:ln>
-            <a:noFill/>
-          </a:ln>
         </p:spPr>
-      </p:pic>
+        <p:txBody>
+          <a:bodyPr anchorCtr="0" anchor="t" bIns="91425" lIns="91425" spcFirstLastPara="1" rIns="91425" wrap="square" tIns="91425">
+            <a:normAutofit/>
+          </a:bodyPr>
+          <a:lstStyle/>
+          <a:p>
+            <a:pPr indent="0" lvl="0" marL="0" rtl="0" algn="l">
+              <a:spcBef>
+                <a:spcPts val="0"/>
+              </a:spcBef>
+              <a:spcAft>
+                <a:spcPts val="0"/>
+              </a:spcAft>
+              <a:buNone/>
+            </a:pPr>
+            <a:r>
+              <a:rPr lang="es-419"/>
+              <a:t>Escribir una </a:t>
+            </a:r>
+            <a:r>
+              <a:rPr lang="es-419"/>
+              <a:t>función</a:t>
+            </a:r>
+            <a:r>
+              <a:rPr lang="es-419"/>
+              <a:t> que reciba dos </a:t>
+            </a:r>
+            <a:r>
+              <a:rPr lang="es-419"/>
+              <a:t>números</a:t>
+            </a:r>
+            <a:r>
+              <a:rPr lang="es-419"/>
+              <a:t> y devuelva en el callback el mayor entre dos </a:t>
+            </a:r>
+            <a:r>
+              <a:rPr lang="es-419"/>
+              <a:t>números</a:t>
+            </a:r>
+            <a:r>
+              <a:rPr lang="es-419"/>
+              <a:t>.</a:t>
+            </a:r>
+            <a:endParaRPr/>
+          </a:p>
+          <a:p>
+            <a:pPr indent="0" lvl="0" marL="0" rtl="0" algn="l">
+              <a:spcBef>
+                <a:spcPts val="1200"/>
+              </a:spcBef>
+              <a:spcAft>
+                <a:spcPts val="0"/>
+              </a:spcAft>
+              <a:buNone/>
+            </a:pPr>
+            <a:r>
+              <a:rPr lang="es-419"/>
+              <a:t>Recordar: </a:t>
+            </a:r>
+            <a:r>
+              <a:rPr b="1" lang="es-419"/>
+              <a:t>function mayor(a, b, callback) { }</a:t>
+            </a:r>
+            <a:endParaRPr b="1"/>
+          </a:p>
+          <a:p>
+            <a:pPr indent="0" lvl="0" marL="0" rtl="0" algn="l">
+              <a:spcBef>
+                <a:spcPts val="1200"/>
+              </a:spcBef>
+              <a:spcAft>
+                <a:spcPts val="1200"/>
+              </a:spcAft>
+              <a:buNone/>
+            </a:pPr>
+            <a:r>
+              <a:t/>
+            </a:r>
+            <a:endParaRPr b="1"/>
+          </a:p>
+        </p:txBody>
+      </p:sp>
     </p:spTree>
   </p:cSld>
   <p:clrMapOvr>
@@ -9575,16 +9933,16 @@
         </p:nvSpPr>
         <p:spPr>
           <a:xfrm>
-            <a:off x="598100" y="2152347"/>
-            <a:ext cx="8222100" cy="838800"/>
+            <a:off x="311700" y="410000"/>
+            <a:ext cx="8520600" cy="607800"/>
           </a:xfrm>
           <a:prstGeom prst="rect">
             <a:avLst/>
           </a:prstGeom>
         </p:spPr>
         <p:txBody>
-          <a:bodyPr anchorCtr="0" anchor="ctr" bIns="91425" lIns="91425" spcFirstLastPara="1" rIns="91425" wrap="square" tIns="91425">
-            <a:normAutofit/>
+          <a:bodyPr anchorCtr="0" anchor="t" bIns="91425" lIns="91425" spcFirstLastPara="1" rIns="91425" wrap="square" tIns="91425">
+            <a:normAutofit fontScale="90000"/>
           </a:bodyPr>
           <a:lstStyle/>
           <a:p>
@@ -9599,12 +9957,40 @@
             </a:pPr>
             <a:r>
               <a:rPr lang="es-419"/>
-              <a:t>Gracias por su atencion!</a:t>
+              <a:t>Solución</a:t>
             </a:r>
             <a:endParaRPr/>
           </a:p>
         </p:txBody>
       </p:sp>
+      <p:pic>
+        <p:nvPicPr>
+          <p:cNvPr id="134" name="Google Shape;134;p21"/>
+          <p:cNvPicPr preferRelativeResize="0"/>
+          <p:nvPr/>
+        </p:nvPicPr>
+        <p:blipFill>
+          <a:blip r:embed="rId3">
+            <a:alphaModFix/>
+          </a:blip>
+          <a:stretch>
+            <a:fillRect/>
+          </a:stretch>
+        </p:blipFill>
+        <p:spPr>
+          <a:xfrm>
+            <a:off x="903938" y="1017800"/>
+            <a:ext cx="7336126" cy="3693975"/>
+          </a:xfrm>
+          <a:prstGeom prst="rect">
+            <a:avLst/>
+          </a:prstGeom>
+          <a:noFill/>
+          <a:ln>
+            <a:noFill/>
+          </a:ln>
+        </p:spPr>
+      </p:pic>
     </p:spTree>
   </p:cSld>
   <p:clrMapOvr>
@@ -9614,6 +10000,285 @@
 </file>
 
 <file path=ppt/theme/theme1.xml><?xml version="1.0" encoding="utf-8"?>
+<a:theme xmlns:a="http://schemas.openxmlformats.org/drawingml/2006/main" xmlns:r="http://schemas.openxmlformats.org/officeDocument/2006/relationships" name="Geometric">
+  <a:themeElements>
+    <a:clrScheme name="Geometric">
+      <a:dk1>
+        <a:srgbClr val="2A3990"/>
+      </a:dk1>
+      <a:lt1>
+        <a:srgbClr val="FFFFFF"/>
+      </a:lt1>
+      <a:dk2>
+        <a:srgbClr val="434343"/>
+      </a:dk2>
+      <a:lt2>
+        <a:srgbClr val="999999"/>
+      </a:lt2>
+      <a:accent1>
+        <a:srgbClr val="212D74"/>
+      </a:accent1>
+      <a:accent2>
+        <a:srgbClr val="3949AB"/>
+      </a:accent2>
+      <a:accent3>
+        <a:srgbClr val="9C254D"/>
+      </a:accent3>
+      <a:accent4>
+        <a:srgbClr val="D23369"/>
+      </a:accent4>
+      <a:accent5>
+        <a:srgbClr val="F06292"/>
+      </a:accent5>
+      <a:accent6>
+        <a:srgbClr val="7890CD"/>
+      </a:accent6>
+      <a:hlink>
+        <a:srgbClr val="F06292"/>
+      </a:hlink>
+      <a:folHlink>
+        <a:srgbClr val="F06292"/>
+      </a:folHlink>
+    </a:clrScheme>
+    <a:fontScheme name="Office">
+      <a:majorFont>
+        <a:latin typeface="Arial"/>
+        <a:ea typeface=""/>
+        <a:cs typeface=""/>
+        <a:font script="Jpan" typeface="ＭＳ Ｐゴシック"/>
+        <a:font script="Hang" typeface="맑은 고딕"/>
+        <a:font script="Hans" typeface="宋体"/>
+        <a:font script="Hant" typeface="新細明體"/>
+        <a:font script="Arab" typeface="Times New Roman"/>
+        <a:font script="Hebr" typeface="Times New Roman"/>
+        <a:font script="Thai" typeface="Angsana New"/>
+        <a:font script="Ethi" typeface="Nyala"/>
+        <a:font script="Beng" typeface="Vrinda"/>
+        <a:font script="Gujr" typeface="Shruti"/>
+        <a:font script="Khmr" typeface="MoolBoran"/>
+        <a:font script="Knda" typeface="Tunga"/>
+        <a:font script="Guru" typeface="Raavi"/>
+        <a:font script="Cans" typeface="Euphemia"/>
+        <a:font script="Cher" typeface="Plantagenet Cherokee"/>
+        <a:font script="Yiii" typeface="Microsoft Yi Baiti"/>
+        <a:font script="Tibt" typeface="Microsoft Himalaya"/>
+        <a:font script="Thaa" typeface="MV Boli"/>
+        <a:font script="Deva" typeface="Mangal"/>
+        <a:font script="Telu" typeface="Gautami"/>
+        <a:font script="Taml" typeface="Latha"/>
+        <a:font script="Syrc" typeface="Estrangelo Edessa"/>
+        <a:font script="Orya" typeface="Kalinga"/>
+        <a:font script="Mlym" typeface="Kartika"/>
+        <a:font script="Laoo" typeface="DokChampa"/>
+        <a:font script="Sinh" typeface="Iskoola Pota"/>
+        <a:font script="Mong" typeface="Mongolian Baiti"/>
+        <a:font script="Viet" typeface="Times New Roman"/>
+        <a:font script="Uigh" typeface="Microsoft Uighur"/>
+        <a:font script="Geor" typeface="Sylfaen"/>
+      </a:majorFont>
+      <a:minorFont>
+        <a:latin typeface="Arial"/>
+        <a:ea typeface=""/>
+        <a:cs typeface=""/>
+        <a:font script="Jpan" typeface="ＭＳ Ｐゴシック"/>
+        <a:font script="Hang" typeface="맑은 고딕"/>
+        <a:font script="Hans" typeface="宋体"/>
+        <a:font script="Hant" typeface="新細明體"/>
+        <a:font script="Arab" typeface="Arial"/>
+        <a:font script="Hebr" typeface="Arial"/>
+        <a:font script="Thai" typeface="Cordia New"/>
+        <a:font script="Ethi" typeface="Nyala"/>
+        <a:font script="Beng" typeface="Vrinda"/>
+        <a:font script="Gujr" typeface="Shruti"/>
+        <a:font script="Khmr" typeface="DaunPenh"/>
+        <a:font script="Knda" typeface="Tunga"/>
+        <a:font script="Guru" typeface="Raavi"/>
+        <a:font script="Cans" typeface="Euphemia"/>
+        <a:font script="Cher" typeface="Plantagenet Cherokee"/>
+        <a:font script="Yiii" typeface="Microsoft Yi Baiti"/>
+        <a:font script="Tibt" typeface="Microsoft Himalaya"/>
+        <a:font script="Thaa" typeface="MV Boli"/>
+        <a:font script="Deva" typeface="Mangal"/>
+        <a:font script="Telu" typeface="Gautami"/>
+        <a:font script="Taml" typeface="Latha"/>
+        <a:font script="Syrc" typeface="Estrangelo Edessa"/>
+        <a:font script="Orya" typeface="Kalinga"/>
+        <a:font script="Mlym" typeface="Kartika"/>
+        <a:font script="Laoo" typeface="DokChampa"/>
+        <a:font script="Sinh" typeface="Iskoola Pota"/>
+        <a:font script="Mong" typeface="Mongolian Baiti"/>
+        <a:font script="Viet" typeface="Arial"/>
+        <a:font script="Uigh" typeface="Microsoft Uighur"/>
+        <a:font script="Geor" typeface="Sylfaen"/>
+      </a:minorFont>
+    </a:fontScheme>
+    <a:fmtScheme name="Office">
+      <a:fillStyleLst>
+        <a:solidFill>
+          <a:schemeClr val="phClr"/>
+        </a:solidFill>
+        <a:gradFill rotWithShape="1">
+          <a:gsLst>
+            <a:gs pos="0">
+              <a:schemeClr val="phClr">
+                <a:tint val="50000"/>
+                <a:satMod val="300000"/>
+              </a:schemeClr>
+            </a:gs>
+            <a:gs pos="35000">
+              <a:schemeClr val="phClr">
+                <a:tint val="37000"/>
+                <a:satMod val="300000"/>
+              </a:schemeClr>
+            </a:gs>
+            <a:gs pos="100000">
+              <a:schemeClr val="phClr">
+                <a:tint val="15000"/>
+                <a:satMod val="350000"/>
+              </a:schemeClr>
+            </a:gs>
+          </a:gsLst>
+          <a:lin ang="16200000" scaled="1"/>
+        </a:gradFill>
+        <a:gradFill rotWithShape="1">
+          <a:gsLst>
+            <a:gs pos="0">
+              <a:schemeClr val="phClr">
+                <a:tint val="100000"/>
+                <a:shade val="100000"/>
+                <a:satMod val="130000"/>
+              </a:schemeClr>
+            </a:gs>
+            <a:gs pos="100000">
+              <a:schemeClr val="phClr">
+                <a:tint val="50000"/>
+                <a:shade val="100000"/>
+                <a:satMod val="350000"/>
+              </a:schemeClr>
+            </a:gs>
+          </a:gsLst>
+          <a:lin ang="16200000" scaled="0"/>
+        </a:gradFill>
+      </a:fillStyleLst>
+      <a:lnStyleLst>
+        <a:ln w="9525" cap="flat" cmpd="sng" algn="ctr">
+          <a:solidFill>
+            <a:schemeClr val="phClr">
+              <a:shade val="95000"/>
+              <a:satMod val="105000"/>
+            </a:schemeClr>
+          </a:solidFill>
+          <a:prstDash val="solid"/>
+        </a:ln>
+        <a:ln w="25400" cap="flat" cmpd="sng" algn="ctr">
+          <a:solidFill>
+            <a:schemeClr val="phClr"/>
+          </a:solidFill>
+          <a:prstDash val="solid"/>
+        </a:ln>
+        <a:ln w="38100" cap="flat" cmpd="sng" algn="ctr">
+          <a:solidFill>
+            <a:schemeClr val="phClr"/>
+          </a:solidFill>
+          <a:prstDash val="solid"/>
+        </a:ln>
+      </a:lnStyleLst>
+      <a:effectStyleLst>
+        <a:effectStyle>
+          <a:effectLst>
+            <a:outerShdw blurRad="40000" dist="20000" dir="5400000" rotWithShape="0">
+              <a:srgbClr val="000000">
+                <a:alpha val="38000"/>
+              </a:srgbClr>
+            </a:outerShdw>
+          </a:effectLst>
+        </a:effectStyle>
+        <a:effectStyle>
+          <a:effectLst>
+            <a:outerShdw blurRad="40000" dist="23000" dir="5400000" rotWithShape="0">
+              <a:srgbClr val="000000">
+                <a:alpha val="35000"/>
+              </a:srgbClr>
+            </a:outerShdw>
+          </a:effectLst>
+        </a:effectStyle>
+        <a:effectStyle>
+          <a:effectLst>
+            <a:outerShdw blurRad="40000" dist="23000" dir="5400000" rotWithShape="0">
+              <a:srgbClr val="000000">
+                <a:alpha val="35000"/>
+              </a:srgbClr>
+            </a:outerShdw>
+          </a:effectLst>
+          <a:scene3d>
+            <a:camera prst="orthographicFront">
+              <a:rot lat="0" lon="0" rev="0"/>
+            </a:camera>
+            <a:lightRig rig="threePt" dir="t">
+              <a:rot lat="0" lon="0" rev="1200000"/>
+            </a:lightRig>
+          </a:scene3d>
+          <a:sp3d>
+            <a:bevelT w="63500" h="25400"/>
+          </a:sp3d>
+        </a:effectStyle>
+      </a:effectStyleLst>
+      <a:bgFillStyleLst>
+        <a:solidFill>
+          <a:schemeClr val="phClr"/>
+        </a:solidFill>
+        <a:gradFill rotWithShape="1">
+          <a:gsLst>
+            <a:gs pos="0">
+              <a:schemeClr val="phClr">
+                <a:tint val="40000"/>
+                <a:satMod val="350000"/>
+              </a:schemeClr>
+            </a:gs>
+            <a:gs pos="40000">
+              <a:schemeClr val="phClr">
+                <a:tint val="45000"/>
+                <a:shade val="99000"/>
+                <a:satMod val="350000"/>
+              </a:schemeClr>
+            </a:gs>
+            <a:gs pos="100000">
+              <a:schemeClr val="phClr">
+                <a:shade val="20000"/>
+                <a:satMod val="255000"/>
+              </a:schemeClr>
+            </a:gs>
+          </a:gsLst>
+          <a:path path="circle">
+            <a:fillToRect l="50000" t="-80000" r="50000" b="180000"/>
+          </a:path>
+        </a:gradFill>
+        <a:gradFill rotWithShape="1">
+          <a:gsLst>
+            <a:gs pos="0">
+              <a:schemeClr val="phClr">
+                <a:tint val="80000"/>
+                <a:satMod val="300000"/>
+              </a:schemeClr>
+            </a:gs>
+            <a:gs pos="100000">
+              <a:schemeClr val="phClr">
+                <a:shade val="30000"/>
+                <a:satMod val="200000"/>
+              </a:schemeClr>
+            </a:gs>
+          </a:gsLst>
+          <a:path path="circle">
+            <a:fillToRect l="50000" t="50000" r="50000" b="50000"/>
+          </a:path>
+        </a:gradFill>
+      </a:bgFillStyleLst>
+    </a:fmtScheme>
+  </a:themeElements>
+</a:theme>
+</file>
+
+<file path=ppt/theme/theme2.xml><?xml version="1.0" encoding="utf-8"?>
 <a:theme xmlns:a="http://schemas.openxmlformats.org/drawingml/2006/main" xmlns:r="http://schemas.openxmlformats.org/officeDocument/2006/relationships">
   <a:themeElements>
     <a:clrScheme name="Default">
@@ -9890,283 +10555,4 @@
     </a:fmtScheme>
   </a:themeElements>
 </a:theme>
-</file>
-
-<file path=ppt/theme/theme2.xml><?xml version="1.0" encoding="utf-8"?>
-<a:theme xmlns:a="http://schemas.openxmlformats.org/drawingml/2006/main" xmlns:r="http://schemas.openxmlformats.org/officeDocument/2006/relationships" name="Geometric">
-  <a:themeElements>
-    <a:clrScheme name="Geometric">
-      <a:dk1>
-        <a:srgbClr val="2A3990"/>
-      </a:dk1>
-      <a:lt1>
-        <a:srgbClr val="FFFFFF"/>
-      </a:lt1>
-      <a:dk2>
-        <a:srgbClr val="434343"/>
-      </a:dk2>
-      <a:lt2>
-        <a:srgbClr val="999999"/>
-      </a:lt2>
-      <a:accent1>
-        <a:srgbClr val="212D74"/>
-      </a:accent1>
-      <a:accent2>
-        <a:srgbClr val="3949AB"/>
-      </a:accent2>
-      <a:accent3>
-        <a:srgbClr val="9C254D"/>
-      </a:accent3>
-      <a:accent4>
-        <a:srgbClr val="D23369"/>
-      </a:accent4>
-      <a:accent5>
-        <a:srgbClr val="F06292"/>
-      </a:accent5>
-      <a:accent6>
-        <a:srgbClr val="7890CD"/>
-      </a:accent6>
-      <a:hlink>
-        <a:srgbClr val="F06292"/>
-      </a:hlink>
-      <a:folHlink>
-        <a:srgbClr val="F06292"/>
-      </a:folHlink>
-    </a:clrScheme>
-    <a:fontScheme name="Office">
-      <a:majorFont>
-        <a:latin typeface="Arial"/>
-        <a:ea typeface=""/>
-        <a:cs typeface=""/>
-        <a:font script="Jpan" typeface="ＭＳ Ｐゴシック"/>
-        <a:font script="Hang" typeface="맑은 고딕"/>
-        <a:font script="Hans" typeface="宋体"/>
-        <a:font script="Hant" typeface="新細明體"/>
-        <a:font script="Arab" typeface="Times New Roman"/>
-        <a:font script="Hebr" typeface="Times New Roman"/>
-        <a:font script="Thai" typeface="Angsana New"/>
-        <a:font script="Ethi" typeface="Nyala"/>
-        <a:font script="Beng" typeface="Vrinda"/>
-        <a:font script="Gujr" typeface="Shruti"/>
-        <a:font script="Khmr" typeface="MoolBoran"/>
-        <a:font script="Knda" typeface="Tunga"/>
-        <a:font script="Guru" typeface="Raavi"/>
-        <a:font script="Cans" typeface="Euphemia"/>
-        <a:font script="Cher" typeface="Plantagenet Cherokee"/>
-        <a:font script="Yiii" typeface="Microsoft Yi Baiti"/>
-        <a:font script="Tibt" typeface="Microsoft Himalaya"/>
-        <a:font script="Thaa" typeface="MV Boli"/>
-        <a:font script="Deva" typeface="Mangal"/>
-        <a:font script="Telu" typeface="Gautami"/>
-        <a:font script="Taml" typeface="Latha"/>
-        <a:font script="Syrc" typeface="Estrangelo Edessa"/>
-        <a:font script="Orya" typeface="Kalinga"/>
-        <a:font script="Mlym" typeface="Kartika"/>
-        <a:font script="Laoo" typeface="DokChampa"/>
-        <a:font script="Sinh" typeface="Iskoola Pota"/>
-        <a:font script="Mong" typeface="Mongolian Baiti"/>
-        <a:font script="Viet" typeface="Times New Roman"/>
-        <a:font script="Uigh" typeface="Microsoft Uighur"/>
-        <a:font script="Geor" typeface="Sylfaen"/>
-      </a:majorFont>
-      <a:minorFont>
-        <a:latin typeface="Arial"/>
-        <a:ea typeface=""/>
-        <a:cs typeface=""/>
-        <a:font script="Jpan" typeface="ＭＳ Ｐゴシック"/>
-        <a:font script="Hang" typeface="맑은 고딕"/>
-        <a:font script="Hans" typeface="宋体"/>
-        <a:font script="Hant" typeface="新細明體"/>
-        <a:font script="Arab" typeface="Arial"/>
-        <a:font script="Hebr" typeface="Arial"/>
-        <a:font script="Thai" typeface="Cordia New"/>
-        <a:font script="Ethi" typeface="Nyala"/>
-        <a:font script="Beng" typeface="Vrinda"/>
-        <a:font script="Gujr" typeface="Shruti"/>
-        <a:font script="Khmr" typeface="DaunPenh"/>
-        <a:font script="Knda" typeface="Tunga"/>
-        <a:font script="Guru" typeface="Raavi"/>
-        <a:font script="Cans" typeface="Euphemia"/>
-        <a:font script="Cher" typeface="Plantagenet Cherokee"/>
-        <a:font script="Yiii" typeface="Microsoft Yi Baiti"/>
-        <a:font script="Tibt" typeface="Microsoft Himalaya"/>
-        <a:font script="Thaa" typeface="MV Boli"/>
-        <a:font script="Deva" typeface="Mangal"/>
-        <a:font script="Telu" typeface="Gautami"/>
-        <a:font script="Taml" typeface="Latha"/>
-        <a:font script="Syrc" typeface="Estrangelo Edessa"/>
-        <a:font script="Orya" typeface="Kalinga"/>
-        <a:font script="Mlym" typeface="Kartika"/>
-        <a:font script="Laoo" typeface="DokChampa"/>
-        <a:font script="Sinh" typeface="Iskoola Pota"/>
-        <a:font script="Mong" typeface="Mongolian Baiti"/>
-        <a:font script="Viet" typeface="Arial"/>
-        <a:font script="Uigh" typeface="Microsoft Uighur"/>
-        <a:font script="Geor" typeface="Sylfaen"/>
-      </a:minorFont>
-    </a:fontScheme>
-    <a:fmtScheme name="Office">
-      <a:fillStyleLst>
-        <a:solidFill>
-          <a:schemeClr val="phClr"/>
-        </a:solidFill>
-        <a:gradFill rotWithShape="1">
-          <a:gsLst>
-            <a:gs pos="0">
-              <a:schemeClr val="phClr">
-                <a:tint val="50000"/>
-                <a:satMod val="300000"/>
-              </a:schemeClr>
-            </a:gs>
-            <a:gs pos="35000">
-              <a:schemeClr val="phClr">
-                <a:tint val="37000"/>
-                <a:satMod val="300000"/>
-              </a:schemeClr>
-            </a:gs>
-            <a:gs pos="100000">
-              <a:schemeClr val="phClr">
-                <a:tint val="15000"/>
-                <a:satMod val="350000"/>
-              </a:schemeClr>
-            </a:gs>
-          </a:gsLst>
-          <a:lin ang="16200000" scaled="1"/>
-        </a:gradFill>
-        <a:gradFill rotWithShape="1">
-          <a:gsLst>
-            <a:gs pos="0">
-              <a:schemeClr val="phClr">
-                <a:tint val="100000"/>
-                <a:shade val="100000"/>
-                <a:satMod val="130000"/>
-              </a:schemeClr>
-            </a:gs>
-            <a:gs pos="100000">
-              <a:schemeClr val="phClr">
-                <a:tint val="50000"/>
-                <a:shade val="100000"/>
-                <a:satMod val="350000"/>
-              </a:schemeClr>
-            </a:gs>
-          </a:gsLst>
-          <a:lin ang="16200000" scaled="0"/>
-        </a:gradFill>
-      </a:fillStyleLst>
-      <a:lnStyleLst>
-        <a:ln w="9525" cap="flat" cmpd="sng" algn="ctr">
-          <a:solidFill>
-            <a:schemeClr val="phClr">
-              <a:shade val="95000"/>
-              <a:satMod val="105000"/>
-            </a:schemeClr>
-          </a:solidFill>
-          <a:prstDash val="solid"/>
-        </a:ln>
-        <a:ln w="25400" cap="flat" cmpd="sng" algn="ctr">
-          <a:solidFill>
-            <a:schemeClr val="phClr"/>
-          </a:solidFill>
-          <a:prstDash val="solid"/>
-        </a:ln>
-        <a:ln w="38100" cap="flat" cmpd="sng" algn="ctr">
-          <a:solidFill>
-            <a:schemeClr val="phClr"/>
-          </a:solidFill>
-          <a:prstDash val="solid"/>
-        </a:ln>
-      </a:lnStyleLst>
-      <a:effectStyleLst>
-        <a:effectStyle>
-          <a:effectLst>
-            <a:outerShdw blurRad="40000" dist="20000" dir="5400000" rotWithShape="0">
-              <a:srgbClr val="000000">
-                <a:alpha val="38000"/>
-              </a:srgbClr>
-            </a:outerShdw>
-          </a:effectLst>
-        </a:effectStyle>
-        <a:effectStyle>
-          <a:effectLst>
-            <a:outerShdw blurRad="40000" dist="23000" dir="5400000" rotWithShape="0">
-              <a:srgbClr val="000000">
-                <a:alpha val="35000"/>
-              </a:srgbClr>
-            </a:outerShdw>
-          </a:effectLst>
-        </a:effectStyle>
-        <a:effectStyle>
-          <a:effectLst>
-            <a:outerShdw blurRad="40000" dist="23000" dir="5400000" rotWithShape="0">
-              <a:srgbClr val="000000">
-                <a:alpha val="35000"/>
-              </a:srgbClr>
-            </a:outerShdw>
-          </a:effectLst>
-          <a:scene3d>
-            <a:camera prst="orthographicFront">
-              <a:rot lat="0" lon="0" rev="0"/>
-            </a:camera>
-            <a:lightRig rig="threePt" dir="t">
-              <a:rot lat="0" lon="0" rev="1200000"/>
-            </a:lightRig>
-          </a:scene3d>
-          <a:sp3d>
-            <a:bevelT w="63500" h="25400"/>
-          </a:sp3d>
-        </a:effectStyle>
-      </a:effectStyleLst>
-      <a:bgFillStyleLst>
-        <a:solidFill>
-          <a:schemeClr val="phClr"/>
-        </a:solidFill>
-        <a:gradFill rotWithShape="1">
-          <a:gsLst>
-            <a:gs pos="0">
-              <a:schemeClr val="phClr">
-                <a:tint val="40000"/>
-                <a:satMod val="350000"/>
-              </a:schemeClr>
-            </a:gs>
-            <a:gs pos="40000">
-              <a:schemeClr val="phClr">
-                <a:tint val="45000"/>
-                <a:shade val="99000"/>
-                <a:satMod val="350000"/>
-              </a:schemeClr>
-            </a:gs>
-            <a:gs pos="100000">
-              <a:schemeClr val="phClr">
-                <a:shade val="20000"/>
-                <a:satMod val="255000"/>
-              </a:schemeClr>
-            </a:gs>
-          </a:gsLst>
-          <a:path path="circle">
-            <a:fillToRect l="50000" t="-80000" r="50000" b="180000"/>
-          </a:path>
-        </a:gradFill>
-        <a:gradFill rotWithShape="1">
-          <a:gsLst>
-            <a:gs pos="0">
-              <a:schemeClr val="phClr">
-                <a:tint val="80000"/>
-                <a:satMod val="300000"/>
-              </a:schemeClr>
-            </a:gs>
-            <a:gs pos="100000">
-              <a:schemeClr val="phClr">
-                <a:shade val="30000"/>
-                <a:satMod val="200000"/>
-              </a:schemeClr>
-            </a:gs>
-          </a:gsLst>
-          <a:path path="circle">
-            <a:fillToRect l="50000" t="50000" r="50000" b="50000"/>
-          </a:path>
-        </a:gradFill>
-      </a:bgFillStyleLst>
-    </a:fmtScheme>
-  </a:themeElements>
-</a:theme>
 </file>
</xml_diff>